<commit_message>
Site updated: 2023-03-27 18:25:44
</commit_message>
<xml_diff>
--- a/2023/02/16/xv6的虚拟存储/xv6虚拟地址转换.pptx
+++ b/2023/02/16/xv6的虚拟存储/xv6虚拟地址转换.pptx
@@ -301,7 +301,7 @@
           <a:p>
             <a:fld id="{40007195-6B88-405A-8041-6F399AB22548}" type="datetimeFigureOut">
               <a:rPr lang="zh-CN" altLang="en-US" smtClean="0"/>
-              <a:t>2023/2/15</a:t>
+              <a:t>2023/2/16</a:t>
             </a:fld>
             <a:endParaRPr lang="zh-CN" altLang="en-US"/>
           </a:p>
@@ -499,7 +499,7 @@
           <a:p>
             <a:fld id="{40007195-6B88-405A-8041-6F399AB22548}" type="datetimeFigureOut">
               <a:rPr lang="zh-CN" altLang="en-US" smtClean="0"/>
-              <a:t>2023/2/15</a:t>
+              <a:t>2023/2/16</a:t>
             </a:fld>
             <a:endParaRPr lang="zh-CN" altLang="en-US"/>
           </a:p>
@@ -707,7 +707,7 @@
           <a:p>
             <a:fld id="{40007195-6B88-405A-8041-6F399AB22548}" type="datetimeFigureOut">
               <a:rPr lang="zh-CN" altLang="en-US" smtClean="0"/>
-              <a:t>2023/2/15</a:t>
+              <a:t>2023/2/16</a:t>
             </a:fld>
             <a:endParaRPr lang="zh-CN" altLang="en-US"/>
           </a:p>
@@ -905,7 +905,7 @@
           <a:p>
             <a:fld id="{40007195-6B88-405A-8041-6F399AB22548}" type="datetimeFigureOut">
               <a:rPr lang="zh-CN" altLang="en-US" smtClean="0"/>
-              <a:t>2023/2/15</a:t>
+              <a:t>2023/2/16</a:t>
             </a:fld>
             <a:endParaRPr lang="zh-CN" altLang="en-US"/>
           </a:p>
@@ -1180,7 +1180,7 @@
           <a:p>
             <a:fld id="{40007195-6B88-405A-8041-6F399AB22548}" type="datetimeFigureOut">
               <a:rPr lang="zh-CN" altLang="en-US" smtClean="0"/>
-              <a:t>2023/2/15</a:t>
+              <a:t>2023/2/16</a:t>
             </a:fld>
             <a:endParaRPr lang="zh-CN" altLang="en-US"/>
           </a:p>
@@ -1445,7 +1445,7 @@
           <a:p>
             <a:fld id="{40007195-6B88-405A-8041-6F399AB22548}" type="datetimeFigureOut">
               <a:rPr lang="zh-CN" altLang="en-US" smtClean="0"/>
-              <a:t>2023/2/15</a:t>
+              <a:t>2023/2/16</a:t>
             </a:fld>
             <a:endParaRPr lang="zh-CN" altLang="en-US"/>
           </a:p>
@@ -1857,7 +1857,7 @@
           <a:p>
             <a:fld id="{40007195-6B88-405A-8041-6F399AB22548}" type="datetimeFigureOut">
               <a:rPr lang="zh-CN" altLang="en-US" smtClean="0"/>
-              <a:t>2023/2/15</a:t>
+              <a:t>2023/2/16</a:t>
             </a:fld>
             <a:endParaRPr lang="zh-CN" altLang="en-US"/>
           </a:p>
@@ -1998,7 +1998,7 @@
           <a:p>
             <a:fld id="{40007195-6B88-405A-8041-6F399AB22548}" type="datetimeFigureOut">
               <a:rPr lang="zh-CN" altLang="en-US" smtClean="0"/>
-              <a:t>2023/2/15</a:t>
+              <a:t>2023/2/16</a:t>
             </a:fld>
             <a:endParaRPr lang="zh-CN" altLang="en-US"/>
           </a:p>
@@ -2111,7 +2111,7 @@
           <a:p>
             <a:fld id="{40007195-6B88-405A-8041-6F399AB22548}" type="datetimeFigureOut">
               <a:rPr lang="zh-CN" altLang="en-US" smtClean="0"/>
-              <a:t>2023/2/15</a:t>
+              <a:t>2023/2/16</a:t>
             </a:fld>
             <a:endParaRPr lang="zh-CN" altLang="en-US"/>
           </a:p>
@@ -2422,7 +2422,7 @@
           <a:p>
             <a:fld id="{40007195-6B88-405A-8041-6F399AB22548}" type="datetimeFigureOut">
               <a:rPr lang="zh-CN" altLang="en-US" smtClean="0"/>
-              <a:t>2023/2/15</a:t>
+              <a:t>2023/2/16</a:t>
             </a:fld>
             <a:endParaRPr lang="zh-CN" altLang="en-US"/>
           </a:p>
@@ -2710,7 +2710,7 @@
           <a:p>
             <a:fld id="{40007195-6B88-405A-8041-6F399AB22548}" type="datetimeFigureOut">
               <a:rPr lang="zh-CN" altLang="en-US" smtClean="0"/>
-              <a:t>2023/2/15</a:t>
+              <a:t>2023/2/16</a:t>
             </a:fld>
             <a:endParaRPr lang="zh-CN" altLang="en-US"/>
           </a:p>
@@ -2951,7 +2951,7 @@
           <a:p>
             <a:fld id="{40007195-6B88-405A-8041-6F399AB22548}" type="datetimeFigureOut">
               <a:rPr lang="zh-CN" altLang="en-US" smtClean="0"/>
-              <a:t>2023/2/15</a:t>
+              <a:t>2023/2/16</a:t>
             </a:fld>
             <a:endParaRPr lang="zh-CN" altLang="en-US"/>
           </a:p>
@@ -9658,50 +9658,14 @@
                             </p:stCondLst>
                             <p:childTnLst>
                               <p:par>
-                                <p:cTn id="19" presetID="1" presetClass="exit" presetSubtype="0" fill="hold" nodeType="afterEffect">
-                                  <p:stCondLst>
-                                    <p:cond delay="0"/>
-                                  </p:stCondLst>
-                                  <p:childTnLst>
-                                    <p:set>
-                                      <p:cBhvr>
-                                        <p:cTn id="20" dur="1" fill="hold">
-                                          <p:stCondLst>
-                                            <p:cond delay="0"/>
-                                          </p:stCondLst>
-                                        </p:cTn>
-                                        <p:tgtEl>
-                                          <p:spTgt spid="116"/>
-                                        </p:tgtEl>
-                                        <p:attrNameLst>
-                                          <p:attrName>style.visibility</p:attrName>
-                                        </p:attrNameLst>
-                                      </p:cBhvr>
-                                      <p:to>
-                                        <p:strVal val="hidden"/>
-                                      </p:to>
-                                    </p:set>
-                                  </p:childTnLst>
-                                </p:cTn>
-                              </p:par>
-                            </p:childTnLst>
-                          </p:cTn>
-                        </p:par>
-                        <p:par>
-                          <p:cTn id="21" fill="hold">
-                            <p:stCondLst>
-                              <p:cond delay="4700"/>
-                            </p:stCondLst>
-                            <p:childTnLst>
-                              <p:par>
-                                <p:cTn id="22" presetID="22" presetClass="entr" presetSubtype="4" fill="hold" nodeType="afterEffect">
+                                <p:cTn id="19" presetID="22" presetClass="entr" presetSubtype="4" fill="hold" nodeType="afterEffect">
                                   <p:stCondLst>
                                     <p:cond delay="600"/>
                                   </p:stCondLst>
                                   <p:childTnLst>
                                     <p:set>
                                       <p:cBhvr>
-                                        <p:cTn id="23" dur="1" fill="hold">
+                                        <p:cTn id="20" dur="1" fill="hold">
                                           <p:stCondLst>
                                             <p:cond delay="0"/>
                                           </p:stCondLst>
@@ -9719,7 +9683,7 @@
                                     </p:set>
                                     <p:animEffect transition="in" filter="wipe(down)">
                                       <p:cBhvr>
-                                        <p:cTn id="24" dur="1200"/>
+                                        <p:cTn id="21" dur="1200"/>
                                         <p:tgtEl>
                                           <p:spTgt spid="61"/>
                                         </p:tgtEl>
@@ -9732,20 +9696,20 @@
                           </p:cTn>
                         </p:par>
                         <p:par>
-                          <p:cTn id="25" fill="hold">
+                          <p:cTn id="22" fill="hold">
                             <p:stCondLst>
                               <p:cond delay="6500"/>
                             </p:stCondLst>
                             <p:childTnLst>
                               <p:par>
-                                <p:cTn id="26" presetID="1" presetClass="exit" presetSubtype="0" fill="hold" nodeType="afterEffect">
+                                <p:cTn id="23" presetID="1" presetClass="exit" presetSubtype="0" fill="hold" nodeType="afterEffect">
                                   <p:stCondLst>
                                     <p:cond delay="500"/>
                                   </p:stCondLst>
                                   <p:childTnLst>
                                     <p:set>
                                       <p:cBhvr>
-                                        <p:cTn id="27" dur="1" fill="hold">
+                                        <p:cTn id="24" dur="1" fill="hold">
                                           <p:stCondLst>
                                             <p:cond delay="0"/>
                                           </p:stCondLst>
@@ -9768,20 +9732,20 @@
                           </p:cTn>
                         </p:par>
                         <p:par>
-                          <p:cTn id="28" fill="hold">
+                          <p:cTn id="25" fill="hold">
                             <p:stCondLst>
                               <p:cond delay="7000"/>
                             </p:stCondLst>
                             <p:childTnLst>
                               <p:par>
-                                <p:cTn id="29" presetID="22" presetClass="entr" presetSubtype="8" fill="hold" nodeType="afterEffect">
+                                <p:cTn id="26" presetID="22" presetClass="entr" presetSubtype="8" fill="hold" nodeType="afterEffect">
                                   <p:stCondLst>
                                     <p:cond delay="600"/>
                                   </p:stCondLst>
                                   <p:childTnLst>
                                     <p:set>
                                       <p:cBhvr>
-                                        <p:cTn id="30" dur="1" fill="hold">
+                                        <p:cTn id="27" dur="1" fill="hold">
                                           <p:stCondLst>
                                             <p:cond delay="0"/>
                                           </p:stCondLst>
@@ -9799,7 +9763,7 @@
                                     </p:set>
                                     <p:animEffect transition="in" filter="wipe(left)">
                                       <p:cBhvr>
-                                        <p:cTn id="31" dur="1500"/>
+                                        <p:cTn id="28" dur="1500"/>
                                         <p:tgtEl>
                                           <p:spTgt spid="51"/>
                                         </p:tgtEl>
@@ -9812,20 +9776,20 @@
                           </p:cTn>
                         </p:par>
                         <p:par>
-                          <p:cTn id="32" fill="hold">
+                          <p:cTn id="29" fill="hold">
                             <p:stCondLst>
                               <p:cond delay="9100"/>
                             </p:stCondLst>
                             <p:childTnLst>
                               <p:par>
-                                <p:cTn id="33" presetID="1" presetClass="exit" presetSubtype="0" fill="hold" nodeType="afterEffect">
+                                <p:cTn id="30" presetID="1" presetClass="exit" presetSubtype="0" fill="hold" nodeType="afterEffect">
                                   <p:stCondLst>
                                     <p:cond delay="300"/>
                                   </p:stCondLst>
                                   <p:childTnLst>
                                     <p:set>
                                       <p:cBhvr>
-                                        <p:cTn id="34" dur="1" fill="hold">
+                                        <p:cTn id="31" dur="1" fill="hold">
                                           <p:stCondLst>
                                             <p:cond delay="0"/>
                                           </p:stCondLst>
@@ -9848,20 +9812,20 @@
                           </p:cTn>
                         </p:par>
                         <p:par>
-                          <p:cTn id="35" fill="hold">
+                          <p:cTn id="32" fill="hold">
                             <p:stCondLst>
                               <p:cond delay="9400"/>
                             </p:stCondLst>
                             <p:childTnLst>
                               <p:par>
-                                <p:cTn id="36" presetID="22" presetClass="entr" presetSubtype="4" fill="hold" nodeType="afterEffect">
+                                <p:cTn id="33" presetID="22" presetClass="entr" presetSubtype="4" fill="hold" nodeType="afterEffect">
                                   <p:stCondLst>
                                     <p:cond delay="600"/>
                                   </p:stCondLst>
                                   <p:childTnLst>
                                     <p:set>
                                       <p:cBhvr>
-                                        <p:cTn id="37" dur="1" fill="hold">
+                                        <p:cTn id="34" dur="1" fill="hold">
                                           <p:stCondLst>
                                             <p:cond delay="0"/>
                                           </p:stCondLst>
@@ -9879,7 +9843,7 @@
                                     </p:set>
                                     <p:animEffect transition="in" filter="wipe(down)">
                                       <p:cBhvr>
-                                        <p:cTn id="38" dur="1200"/>
+                                        <p:cTn id="35" dur="1200"/>
                                         <p:tgtEl>
                                           <p:spTgt spid="110"/>
                                         </p:tgtEl>
@@ -9892,15 +9856,51 @@
                           </p:cTn>
                         </p:par>
                         <p:par>
-                          <p:cTn id="39" fill="hold">
+                          <p:cTn id="36" fill="hold">
                             <p:stCondLst>
                               <p:cond delay="11200"/>
                             </p:stCondLst>
                             <p:childTnLst>
                               <p:par>
+                                <p:cTn id="37" presetID="1" presetClass="exit" presetSubtype="0" fill="hold" nodeType="afterEffect">
+                                  <p:stCondLst>
+                                    <p:cond delay="500"/>
+                                  </p:stCondLst>
+                                  <p:childTnLst>
+                                    <p:set>
+                                      <p:cBhvr>
+                                        <p:cTn id="38" dur="1" fill="hold">
+                                          <p:stCondLst>
+                                            <p:cond delay="0"/>
+                                          </p:stCondLst>
+                                        </p:cTn>
+                                        <p:tgtEl>
+                                          <p:spTgt spid="110"/>
+                                        </p:tgtEl>
+                                        <p:attrNameLst>
+                                          <p:attrName>style.visibility</p:attrName>
+                                        </p:attrNameLst>
+                                      </p:cBhvr>
+                                      <p:to>
+                                        <p:strVal val="hidden"/>
+                                      </p:to>
+                                    </p:set>
+                                  </p:childTnLst>
+                                </p:cTn>
+                              </p:par>
+                            </p:childTnLst>
+                          </p:cTn>
+                        </p:par>
+                        <p:par>
+                          <p:cTn id="39" fill="hold">
+                            <p:stCondLst>
+                              <p:cond delay="11700"/>
+                            </p:stCondLst>
+                            <p:childTnLst>
+                              <p:par>
                                 <p:cTn id="40" presetID="1" presetClass="exit" presetSubtype="0" fill="hold" nodeType="afterEffect">
                                   <p:stCondLst>
-                                    <p:cond delay="500"/>
+                                    <p:cond delay="0"/>
                                   </p:stCondLst>
                                   <p:childTnLst>
                                     <p:set>
@@ -9911,7 +9911,7 @@
                                           </p:stCondLst>
                                         </p:cTn>
                                         <p:tgtEl>
-                                          <p:spTgt spid="110"/>
+                                          <p:spTgt spid="116"/>
                                         </p:tgtEl>
                                         <p:attrNameLst>
                                           <p:attrName>style.visibility</p:attrName>

</xml_diff>